<commit_message>
Update Android PPT 01
</commit_message>
<xml_diff>
--- a/PPT/카메라 기반 실시간 영상처리 기능을 포함한 안드로이드 앱 개발 01.pptx
+++ b/PPT/카메라 기반 실시간 영상처리 기능을 포함한 안드로이드 앱 개발 01.pptx
@@ -5,7 +5,7 @@
     <p:sldMasterId id="2147483648" r:id="rId1"/>
   </p:sldMasterIdLst>
   <p:notesMasterIdLst>
-    <p:notesMasterId r:id="rId33"/>
+    <p:notesMasterId r:id="rId40"/>
   </p:notesMasterIdLst>
   <p:sldIdLst>
     <p:sldId id="256" r:id="rId2"/>
@@ -38,7 +38,14 @@
     <p:sldId id="345" r:id="rId29"/>
     <p:sldId id="346" r:id="rId30"/>
     <p:sldId id="347" r:id="rId31"/>
-    <p:sldId id="262" r:id="rId32"/>
+    <p:sldId id="348" r:id="rId32"/>
+    <p:sldId id="349" r:id="rId33"/>
+    <p:sldId id="350" r:id="rId34"/>
+    <p:sldId id="351" r:id="rId35"/>
+    <p:sldId id="352" r:id="rId36"/>
+    <p:sldId id="353" r:id="rId37"/>
+    <p:sldId id="354" r:id="rId38"/>
+    <p:sldId id="262" r:id="rId39"/>
   </p:sldIdLst>
   <p:sldSz cx="12192000" cy="6858000"/>
   <p:notesSz cx="6858000" cy="9144000"/>
@@ -12610,6 +12617,1825 @@
 </file>
 
 <file path=ppt/slides/slide31.xml><?xml version="1.0" encoding="utf-8"?>
+<p:sld xmlns:a="http://schemas.openxmlformats.org/drawingml/2006/main" xmlns:r="http://schemas.openxmlformats.org/officeDocument/2006/relationships" xmlns:p="http://schemas.openxmlformats.org/presentationml/2006/main">
+  <p:cSld>
+    <p:spTree>
+      <p:nvGrpSpPr>
+        <p:cNvPr id="1" name=""/>
+        <p:cNvGrpSpPr/>
+        <p:nvPr/>
+      </p:nvGrpSpPr>
+      <p:grpSpPr>
+        <a:xfrm>
+          <a:off x="0" y="0"/>
+          <a:ext cx="0" cy="0"/>
+          <a:chOff x="0" y="0"/>
+          <a:chExt cx="0" cy="0"/>
+        </a:xfrm>
+      </p:grpSpPr>
+      <p:sp>
+        <p:nvSpPr>
+          <p:cNvPr id="2" name="텍스트 개체 틀 1">
+            <a:extLst>
+              <a:ext uri="{FF2B5EF4-FFF2-40B4-BE49-F238E27FC236}">
+                <a16:creationId xmlns:a16="http://schemas.microsoft.com/office/drawing/2014/main" id="{6DA4C9B3-2C63-4453-8F40-DD3870893A8E}"/>
+              </a:ext>
+            </a:extLst>
+          </p:cNvPr>
+          <p:cNvSpPr>
+            <a:spLocks noGrp="1"/>
+          </p:cNvSpPr>
+          <p:nvPr>
+            <p:ph type="body" sz="quarter" idx="13"/>
+          </p:nvPr>
+        </p:nvSpPr>
+        <p:spPr/>
+        <p:txBody>
+          <a:bodyPr>
+            <a:normAutofit fontScale="92500" lnSpcReduction="10000"/>
+          </a:bodyPr>
+          <a:lstStyle/>
+          <a:p>
+            <a:r>
+              <a:rPr lang="en-US" altLang="ko-KR" b="1" dirty="0"/>
+              <a:t>04</a:t>
+            </a:r>
+            <a:endParaRPr lang="ko-KR" altLang="en-US" b="1" dirty="0"/>
+          </a:p>
+        </p:txBody>
+      </p:sp>
+      <p:sp>
+        <p:nvSpPr>
+          <p:cNvPr id="3" name="텍스트 개체 틀 2">
+            <a:extLst>
+              <a:ext uri="{FF2B5EF4-FFF2-40B4-BE49-F238E27FC236}">
+                <a16:creationId xmlns:a16="http://schemas.microsoft.com/office/drawing/2014/main" id="{9ECEBF0C-A8E8-4871-B2CA-0EBEDA355F07}"/>
+              </a:ext>
+            </a:extLst>
+          </p:cNvPr>
+          <p:cNvSpPr>
+            <a:spLocks noGrp="1"/>
+          </p:cNvSpPr>
+          <p:nvPr>
+            <p:ph type="body" sz="quarter" idx="14"/>
+          </p:nvPr>
+        </p:nvSpPr>
+        <p:spPr/>
+        <p:txBody>
+          <a:bodyPr/>
+          <a:lstStyle/>
+          <a:p>
+            <a:r>
+              <a:rPr lang="en-US" altLang="ko-KR" b="1" dirty="0"/>
+              <a:t>Layout</a:t>
+            </a:r>
+            <a:endParaRPr lang="ko-KR" altLang="en-US" b="1" dirty="0"/>
+          </a:p>
+        </p:txBody>
+      </p:sp>
+      <p:sp>
+        <p:nvSpPr>
+          <p:cNvPr id="4" name="텍스트 개체 틀 3">
+            <a:extLst>
+              <a:ext uri="{FF2B5EF4-FFF2-40B4-BE49-F238E27FC236}">
+                <a16:creationId xmlns:a16="http://schemas.microsoft.com/office/drawing/2014/main" id="{B49FEE3A-7EC1-4A37-8AAC-6D8866E6E3AD}"/>
+              </a:ext>
+            </a:extLst>
+          </p:cNvPr>
+          <p:cNvSpPr>
+            <a:spLocks noGrp="1"/>
+          </p:cNvSpPr>
+          <p:nvPr>
+            <p:ph type="body" sz="quarter" idx="15"/>
+          </p:nvPr>
+        </p:nvSpPr>
+        <p:spPr/>
+        <p:txBody>
+          <a:bodyPr/>
+          <a:lstStyle/>
+          <a:p>
+            <a:r>
+              <a:rPr lang="ko-KR" altLang="en-US" b="1" dirty="0"/>
+              <a:t>목표</a:t>
+            </a:r>
+            <a:endParaRPr lang="en-US" altLang="ko-KR" b="1" dirty="0"/>
+          </a:p>
+          <a:p>
+            <a:pPr marL="285750" indent="-285750">
+              <a:buFont typeface="Arial" panose="020B0604020202020204" pitchFamily="34" charset="0"/>
+              <a:buChar char="•"/>
+            </a:pPr>
+            <a:r>
+              <a:rPr lang="en-US" altLang="ko-KR" dirty="0"/>
+              <a:t>Android</a:t>
+            </a:r>
+            <a:r>
+              <a:rPr lang="ko-KR" altLang="en-US" dirty="0"/>
+              <a:t>의 </a:t>
+            </a:r>
+            <a:r>
+              <a:rPr lang="en-US" altLang="ko-KR" dirty="0"/>
+              <a:t>layout</a:t>
+            </a:r>
+            <a:r>
+              <a:rPr lang="ko-KR" altLang="en-US" dirty="0"/>
+              <a:t>에 대한 이해</a:t>
+            </a:r>
+            <a:endParaRPr lang="en-US" altLang="ko-KR" dirty="0"/>
+          </a:p>
+          <a:p>
+            <a:pPr marL="285750" indent="-285750">
+              <a:buFont typeface="Arial" panose="020B0604020202020204" pitchFamily="34" charset="0"/>
+              <a:buChar char="•"/>
+            </a:pPr>
+            <a:endParaRPr lang="en-US" altLang="ko-KR" dirty="0"/>
+          </a:p>
+        </p:txBody>
+      </p:sp>
+      <p:sp>
+        <p:nvSpPr>
+          <p:cNvPr id="5" name="슬라이드 번호 개체 틀 4">
+            <a:extLst>
+              <a:ext uri="{FF2B5EF4-FFF2-40B4-BE49-F238E27FC236}">
+                <a16:creationId xmlns:a16="http://schemas.microsoft.com/office/drawing/2014/main" id="{423E0977-1D3F-4826-AB80-7E3B178FEE23}"/>
+              </a:ext>
+            </a:extLst>
+          </p:cNvPr>
+          <p:cNvSpPr>
+            <a:spLocks noGrp="1"/>
+          </p:cNvSpPr>
+          <p:nvPr>
+            <p:ph type="sldNum" sz="quarter" idx="12"/>
+          </p:nvPr>
+        </p:nvSpPr>
+        <p:spPr/>
+        <p:txBody>
+          <a:bodyPr/>
+          <a:lstStyle/>
+          <a:p>
+            <a:fld id="{28033542-72CD-49C1-9B51-668B00668B43}" type="slidenum">
+              <a:rPr lang="ko-KR" altLang="en-US" smtClean="0"/>
+              <a:t>31</a:t>
+            </a:fld>
+            <a:endParaRPr lang="ko-KR" altLang="en-US"/>
+          </a:p>
+        </p:txBody>
+      </p:sp>
+    </p:spTree>
+    <p:extLst>
+      <p:ext uri="{BB962C8B-B14F-4D97-AF65-F5344CB8AC3E}">
+        <p14:creationId xmlns:p14="http://schemas.microsoft.com/office/powerpoint/2010/main" val="3012835922"/>
+      </p:ext>
+    </p:extLst>
+  </p:cSld>
+  <p:clrMapOvr>
+    <a:masterClrMapping/>
+  </p:clrMapOvr>
+</p:sld>
+</file>
+
+<file path=ppt/slides/slide32.xml><?xml version="1.0" encoding="utf-8"?>
+<p:sld xmlns:a="http://schemas.openxmlformats.org/drawingml/2006/main" xmlns:r="http://schemas.openxmlformats.org/officeDocument/2006/relationships" xmlns:p="http://schemas.openxmlformats.org/presentationml/2006/main">
+  <p:cSld>
+    <p:spTree>
+      <p:nvGrpSpPr>
+        <p:cNvPr id="1" name=""/>
+        <p:cNvGrpSpPr/>
+        <p:nvPr/>
+      </p:nvGrpSpPr>
+      <p:grpSpPr>
+        <a:xfrm>
+          <a:off x="0" y="0"/>
+          <a:ext cx="0" cy="0"/>
+          <a:chOff x="0" y="0"/>
+          <a:chExt cx="0" cy="0"/>
+        </a:xfrm>
+      </p:grpSpPr>
+      <p:sp>
+        <p:nvSpPr>
+          <p:cNvPr id="2" name="제목 1">
+            <a:extLst>
+              <a:ext uri="{FF2B5EF4-FFF2-40B4-BE49-F238E27FC236}">
+                <a16:creationId xmlns:a16="http://schemas.microsoft.com/office/drawing/2014/main" id="{93EC9EF1-25B2-470B-8958-64B218A29447}"/>
+              </a:ext>
+            </a:extLst>
+          </p:cNvPr>
+          <p:cNvSpPr>
+            <a:spLocks noGrp="1"/>
+          </p:cNvSpPr>
+          <p:nvPr>
+            <p:ph type="title"/>
+          </p:nvPr>
+        </p:nvSpPr>
+        <p:spPr/>
+        <p:txBody>
+          <a:bodyPr>
+            <a:normAutofit fontScale="90000"/>
+          </a:bodyPr>
+          <a:lstStyle/>
+          <a:p>
+            <a:r>
+              <a:rPr lang="en-US" altLang="ko-KR" dirty="0"/>
+              <a:t>Layout</a:t>
+            </a:r>
+            <a:endParaRPr lang="ko-KR" altLang="en-US" dirty="0"/>
+          </a:p>
+        </p:txBody>
+      </p:sp>
+      <p:sp>
+        <p:nvSpPr>
+          <p:cNvPr id="3" name="내용 개체 틀 2">
+            <a:extLst>
+              <a:ext uri="{FF2B5EF4-FFF2-40B4-BE49-F238E27FC236}">
+                <a16:creationId xmlns:a16="http://schemas.microsoft.com/office/drawing/2014/main" id="{3AE5EED4-91BA-44E1-9311-944BA85AD85D}"/>
+              </a:ext>
+            </a:extLst>
+          </p:cNvPr>
+          <p:cNvSpPr>
+            <a:spLocks noGrp="1"/>
+          </p:cNvSpPr>
+          <p:nvPr>
+            <p:ph idx="1"/>
+          </p:nvPr>
+        </p:nvSpPr>
+        <p:spPr/>
+        <p:txBody>
+          <a:bodyPr>
+            <a:normAutofit fontScale="85000" lnSpcReduction="20000"/>
+          </a:bodyPr>
+          <a:lstStyle/>
+          <a:p>
+            <a:r>
+              <a:rPr lang="en-US" altLang="ko-KR" dirty="0"/>
+              <a:t>Layout</a:t>
+            </a:r>
+            <a:r>
+              <a:rPr lang="ko-KR" altLang="en-US" dirty="0"/>
+              <a:t>의 종류</a:t>
+            </a:r>
+          </a:p>
+        </p:txBody>
+      </p:sp>
+      <p:sp>
+        <p:nvSpPr>
+          <p:cNvPr id="4" name="텍스트 개체 틀 3">
+            <a:extLst>
+              <a:ext uri="{FF2B5EF4-FFF2-40B4-BE49-F238E27FC236}">
+                <a16:creationId xmlns:a16="http://schemas.microsoft.com/office/drawing/2014/main" id="{92BAEDC0-2F4D-4109-AAF6-73297C38FC55}"/>
+              </a:ext>
+            </a:extLst>
+          </p:cNvPr>
+          <p:cNvSpPr>
+            <a:spLocks noGrp="1"/>
+          </p:cNvSpPr>
+          <p:nvPr>
+            <p:ph type="body" sz="quarter" idx="13"/>
+          </p:nvPr>
+        </p:nvSpPr>
+        <p:spPr/>
+        <p:txBody>
+          <a:bodyPr/>
+          <a:lstStyle/>
+          <a:p>
+            <a:r>
+              <a:rPr lang="en-US" altLang="ko-KR" dirty="0"/>
+              <a:t>04</a:t>
+            </a:r>
+            <a:endParaRPr lang="ko-KR" altLang="en-US" dirty="0"/>
+          </a:p>
+        </p:txBody>
+      </p:sp>
+      <p:sp>
+        <p:nvSpPr>
+          <p:cNvPr id="15" name="슬라이드 번호 개체 틀 14">
+            <a:extLst>
+              <a:ext uri="{FF2B5EF4-FFF2-40B4-BE49-F238E27FC236}">
+                <a16:creationId xmlns:a16="http://schemas.microsoft.com/office/drawing/2014/main" id="{79B9229E-D7CD-40C2-B26F-0BF4AC1E9E93}"/>
+              </a:ext>
+            </a:extLst>
+          </p:cNvPr>
+          <p:cNvSpPr>
+            <a:spLocks noGrp="1"/>
+          </p:cNvSpPr>
+          <p:nvPr>
+            <p:ph type="sldNum" sz="quarter" idx="12"/>
+          </p:nvPr>
+        </p:nvSpPr>
+        <p:spPr/>
+        <p:txBody>
+          <a:bodyPr/>
+          <a:lstStyle/>
+          <a:p>
+            <a:fld id="{28033542-72CD-49C1-9B51-668B00668B43}" type="slidenum">
+              <a:rPr lang="ko-KR" altLang="en-US" smtClean="0"/>
+              <a:t>32</a:t>
+            </a:fld>
+            <a:endParaRPr lang="ko-KR" altLang="en-US"/>
+          </a:p>
+        </p:txBody>
+      </p:sp>
+      <p:sp>
+        <p:nvSpPr>
+          <p:cNvPr id="13" name="TextBox 12">
+            <a:extLst>
+              <a:ext uri="{FF2B5EF4-FFF2-40B4-BE49-F238E27FC236}">
+                <a16:creationId xmlns:a16="http://schemas.microsoft.com/office/drawing/2014/main" id="{E2D893D9-3930-4552-9C6B-0E0B88029121}"/>
+              </a:ext>
+            </a:extLst>
+          </p:cNvPr>
+          <p:cNvSpPr txBox="1"/>
+          <p:nvPr/>
+        </p:nvSpPr>
+        <p:spPr>
+          <a:xfrm>
+            <a:off x="700897" y="1140473"/>
+            <a:ext cx="10368722" cy="2123658"/>
+          </a:xfrm>
+          <a:prstGeom prst="rect">
+            <a:avLst/>
+          </a:prstGeom>
+          <a:noFill/>
+        </p:spPr>
+        <p:txBody>
+          <a:bodyPr wrap="square" rtlCol="0">
+            <a:spAutoFit/>
+          </a:bodyPr>
+          <a:lstStyle/>
+          <a:p>
+            <a:pPr marL="285750" indent="-285750">
+              <a:buFont typeface="Arial" panose="020B0604020202020204" pitchFamily="34" charset="0"/>
+              <a:buChar char="•"/>
+            </a:pPr>
+            <a:r>
+              <a:rPr lang="en-US" altLang="ko-KR" sz="2400" dirty="0"/>
+              <a:t>Layout</a:t>
+            </a:r>
+            <a:r>
+              <a:rPr lang="ko-KR" altLang="en-US" sz="2400" dirty="0"/>
+              <a:t>의 종류</a:t>
+            </a:r>
+            <a:endParaRPr lang="en-US" altLang="ko-KR" sz="2400" dirty="0"/>
+          </a:p>
+          <a:p>
+            <a:pPr marL="742950" lvl="1" indent="-285750">
+              <a:buFont typeface="Arial" panose="020B0604020202020204" pitchFamily="34" charset="0"/>
+              <a:buChar char="•"/>
+            </a:pPr>
+            <a:r>
+              <a:rPr lang="en-US" altLang="ko-KR" b="1" dirty="0"/>
+              <a:t>Linear layout</a:t>
+            </a:r>
+          </a:p>
+          <a:p>
+            <a:pPr marL="742950" lvl="1" indent="-285750">
+              <a:buFont typeface="Arial" panose="020B0604020202020204" pitchFamily="34" charset="0"/>
+              <a:buChar char="•"/>
+            </a:pPr>
+            <a:r>
+              <a:rPr lang="en-US" altLang="ko-KR" dirty="0"/>
+              <a:t>Relative layout (=&gt; </a:t>
+            </a:r>
+            <a:r>
+              <a:rPr lang="en-US" altLang="ko-KR" b="1" dirty="0"/>
+              <a:t>Constraint layout</a:t>
+            </a:r>
+            <a:r>
+              <a:rPr lang="en-US" altLang="ko-KR" dirty="0"/>
+              <a:t>)</a:t>
+            </a:r>
+          </a:p>
+          <a:p>
+            <a:pPr marL="742950" lvl="1" indent="-285750">
+              <a:buFont typeface="Arial" panose="020B0604020202020204" pitchFamily="34" charset="0"/>
+              <a:buChar char="•"/>
+            </a:pPr>
+            <a:r>
+              <a:rPr lang="en-US" altLang="ko-KR" dirty="0"/>
+              <a:t>Table layout</a:t>
+            </a:r>
+          </a:p>
+          <a:p>
+            <a:pPr marL="742950" lvl="1" indent="-285750">
+              <a:buFont typeface="Arial" panose="020B0604020202020204" pitchFamily="34" charset="0"/>
+              <a:buChar char="•"/>
+            </a:pPr>
+            <a:r>
+              <a:rPr lang="en-US" altLang="ko-KR" dirty="0"/>
+              <a:t>Grid layout</a:t>
+            </a:r>
+          </a:p>
+          <a:p>
+            <a:pPr marL="742950" lvl="1" indent="-285750">
+              <a:buFont typeface="Arial" panose="020B0604020202020204" pitchFamily="34" charset="0"/>
+              <a:buChar char="•"/>
+            </a:pPr>
+            <a:r>
+              <a:rPr lang="en-US" altLang="ko-KR" b="1" dirty="0"/>
+              <a:t>Frame layout</a:t>
+            </a:r>
+          </a:p>
+          <a:p>
+            <a:pPr marL="742950" lvl="1" indent="-285750">
+              <a:buFont typeface="Arial" panose="020B0604020202020204" pitchFamily="34" charset="0"/>
+              <a:buChar char="•"/>
+            </a:pPr>
+            <a:endParaRPr lang="en-US" altLang="ko-KR" dirty="0"/>
+          </a:p>
+        </p:txBody>
+      </p:sp>
+      <p:pic>
+        <p:nvPicPr>
+          <p:cNvPr id="1026" name="Picture 2">
+            <a:extLst>
+              <a:ext uri="{FF2B5EF4-FFF2-40B4-BE49-F238E27FC236}">
+                <a16:creationId xmlns:a16="http://schemas.microsoft.com/office/drawing/2014/main" id="{A2F03225-D483-4FD5-B9FA-92D60CD653FA}"/>
+              </a:ext>
+            </a:extLst>
+          </p:cNvPr>
+          <p:cNvPicPr>
+            <a:picLocks noChangeAspect="1" noChangeArrowheads="1"/>
+          </p:cNvPicPr>
+          <p:nvPr/>
+        </p:nvPicPr>
+        <p:blipFill>
+          <a:blip r:embed="rId2">
+            <a:extLst>
+              <a:ext uri="{28A0092B-C50C-407E-A947-70E740481C1C}">
+                <a14:useLocalDpi xmlns:a14="http://schemas.microsoft.com/office/drawing/2010/main" val="0"/>
+              </a:ext>
+            </a:extLst>
+          </a:blip>
+          <a:srcRect/>
+          <a:stretch>
+            <a:fillRect/>
+          </a:stretch>
+        </p:blipFill>
+        <p:spPr bwMode="auto">
+          <a:xfrm>
+            <a:off x="2933700" y="3870869"/>
+            <a:ext cx="6324600" cy="1943100"/>
+          </a:xfrm>
+          <a:prstGeom prst="rect">
+            <a:avLst/>
+          </a:prstGeom>
+          <a:noFill/>
+          <a:extLst>
+            <a:ext uri="{909E8E84-426E-40DD-AFC4-6F175D3DCCD1}">
+              <a14:hiddenFill xmlns:a14="http://schemas.microsoft.com/office/drawing/2010/main">
+                <a:solidFill>
+                  <a:srgbClr val="FFFFFF"/>
+                </a:solidFill>
+              </a14:hiddenFill>
+            </a:ext>
+          </a:extLst>
+        </p:spPr>
+      </p:pic>
+    </p:spTree>
+    <p:extLst>
+      <p:ext uri="{BB962C8B-B14F-4D97-AF65-F5344CB8AC3E}">
+        <p14:creationId xmlns:p14="http://schemas.microsoft.com/office/powerpoint/2010/main" val="3229011263"/>
+      </p:ext>
+    </p:extLst>
+  </p:cSld>
+  <p:clrMapOvr>
+    <a:masterClrMapping/>
+  </p:clrMapOvr>
+</p:sld>
+</file>
+
+<file path=ppt/slides/slide33.xml><?xml version="1.0" encoding="utf-8"?>
+<p:sld xmlns:a="http://schemas.openxmlformats.org/drawingml/2006/main" xmlns:r="http://schemas.openxmlformats.org/officeDocument/2006/relationships" xmlns:p="http://schemas.openxmlformats.org/presentationml/2006/main">
+  <p:cSld>
+    <p:spTree>
+      <p:nvGrpSpPr>
+        <p:cNvPr id="1" name=""/>
+        <p:cNvGrpSpPr/>
+        <p:nvPr/>
+      </p:nvGrpSpPr>
+      <p:grpSpPr>
+        <a:xfrm>
+          <a:off x="0" y="0"/>
+          <a:ext cx="0" cy="0"/>
+          <a:chOff x="0" y="0"/>
+          <a:chExt cx="0" cy="0"/>
+        </a:xfrm>
+      </p:grpSpPr>
+      <p:sp>
+        <p:nvSpPr>
+          <p:cNvPr id="2" name="제목 1">
+            <a:extLst>
+              <a:ext uri="{FF2B5EF4-FFF2-40B4-BE49-F238E27FC236}">
+                <a16:creationId xmlns:a16="http://schemas.microsoft.com/office/drawing/2014/main" id="{93EC9EF1-25B2-470B-8958-64B218A29447}"/>
+              </a:ext>
+            </a:extLst>
+          </p:cNvPr>
+          <p:cNvSpPr>
+            <a:spLocks noGrp="1"/>
+          </p:cNvSpPr>
+          <p:nvPr>
+            <p:ph type="title"/>
+          </p:nvPr>
+        </p:nvSpPr>
+        <p:spPr/>
+        <p:txBody>
+          <a:bodyPr>
+            <a:normAutofit fontScale="90000"/>
+          </a:bodyPr>
+          <a:lstStyle/>
+          <a:p>
+            <a:r>
+              <a:rPr lang="en-US" altLang="ko-KR" dirty="0"/>
+              <a:t>Layout</a:t>
+            </a:r>
+            <a:endParaRPr lang="ko-KR" altLang="en-US" dirty="0"/>
+          </a:p>
+        </p:txBody>
+      </p:sp>
+      <p:sp>
+        <p:nvSpPr>
+          <p:cNvPr id="3" name="내용 개체 틀 2">
+            <a:extLst>
+              <a:ext uri="{FF2B5EF4-FFF2-40B4-BE49-F238E27FC236}">
+                <a16:creationId xmlns:a16="http://schemas.microsoft.com/office/drawing/2014/main" id="{3AE5EED4-91BA-44E1-9311-944BA85AD85D}"/>
+              </a:ext>
+            </a:extLst>
+          </p:cNvPr>
+          <p:cNvSpPr>
+            <a:spLocks noGrp="1"/>
+          </p:cNvSpPr>
+          <p:nvPr>
+            <p:ph idx="1"/>
+          </p:nvPr>
+        </p:nvSpPr>
+        <p:spPr/>
+        <p:txBody>
+          <a:bodyPr>
+            <a:normAutofit fontScale="85000" lnSpcReduction="20000"/>
+          </a:bodyPr>
+          <a:lstStyle/>
+          <a:p>
+            <a:r>
+              <a:rPr lang="en-US" altLang="ko-KR" dirty="0"/>
+              <a:t>Linear layout</a:t>
+            </a:r>
+            <a:endParaRPr lang="ko-KR" altLang="en-US" dirty="0"/>
+          </a:p>
+        </p:txBody>
+      </p:sp>
+      <p:sp>
+        <p:nvSpPr>
+          <p:cNvPr id="4" name="텍스트 개체 틀 3">
+            <a:extLst>
+              <a:ext uri="{FF2B5EF4-FFF2-40B4-BE49-F238E27FC236}">
+                <a16:creationId xmlns:a16="http://schemas.microsoft.com/office/drawing/2014/main" id="{92BAEDC0-2F4D-4109-AAF6-73297C38FC55}"/>
+              </a:ext>
+            </a:extLst>
+          </p:cNvPr>
+          <p:cNvSpPr>
+            <a:spLocks noGrp="1"/>
+          </p:cNvSpPr>
+          <p:nvPr>
+            <p:ph type="body" sz="quarter" idx="13"/>
+          </p:nvPr>
+        </p:nvSpPr>
+        <p:spPr/>
+        <p:txBody>
+          <a:bodyPr/>
+          <a:lstStyle/>
+          <a:p>
+            <a:r>
+              <a:rPr lang="en-US" altLang="ko-KR" dirty="0"/>
+              <a:t>04</a:t>
+            </a:r>
+            <a:endParaRPr lang="ko-KR" altLang="en-US" dirty="0"/>
+          </a:p>
+        </p:txBody>
+      </p:sp>
+      <p:sp>
+        <p:nvSpPr>
+          <p:cNvPr id="15" name="슬라이드 번호 개체 틀 14">
+            <a:extLst>
+              <a:ext uri="{FF2B5EF4-FFF2-40B4-BE49-F238E27FC236}">
+                <a16:creationId xmlns:a16="http://schemas.microsoft.com/office/drawing/2014/main" id="{79B9229E-D7CD-40C2-B26F-0BF4AC1E9E93}"/>
+              </a:ext>
+            </a:extLst>
+          </p:cNvPr>
+          <p:cNvSpPr>
+            <a:spLocks noGrp="1"/>
+          </p:cNvSpPr>
+          <p:nvPr>
+            <p:ph type="sldNum" sz="quarter" idx="12"/>
+          </p:nvPr>
+        </p:nvSpPr>
+        <p:spPr/>
+        <p:txBody>
+          <a:bodyPr/>
+          <a:lstStyle/>
+          <a:p>
+            <a:fld id="{28033542-72CD-49C1-9B51-668B00668B43}" type="slidenum">
+              <a:rPr lang="ko-KR" altLang="en-US" smtClean="0"/>
+              <a:t>33</a:t>
+            </a:fld>
+            <a:endParaRPr lang="ko-KR" altLang="en-US"/>
+          </a:p>
+        </p:txBody>
+      </p:sp>
+      <p:sp>
+        <p:nvSpPr>
+          <p:cNvPr id="13" name="TextBox 12">
+            <a:extLst>
+              <a:ext uri="{FF2B5EF4-FFF2-40B4-BE49-F238E27FC236}">
+                <a16:creationId xmlns:a16="http://schemas.microsoft.com/office/drawing/2014/main" id="{E2D893D9-3930-4552-9C6B-0E0B88029121}"/>
+              </a:ext>
+            </a:extLst>
+          </p:cNvPr>
+          <p:cNvSpPr txBox="1"/>
+          <p:nvPr/>
+        </p:nvSpPr>
+        <p:spPr>
+          <a:xfrm>
+            <a:off x="700897" y="1140473"/>
+            <a:ext cx="10368722" cy="1446550"/>
+          </a:xfrm>
+          <a:prstGeom prst="rect">
+            <a:avLst/>
+          </a:prstGeom>
+          <a:noFill/>
+        </p:spPr>
+        <p:txBody>
+          <a:bodyPr wrap="square" rtlCol="0">
+            <a:spAutoFit/>
+          </a:bodyPr>
+          <a:lstStyle/>
+          <a:p>
+            <a:pPr marL="285750" indent="-285750">
+              <a:buFont typeface="Arial" panose="020B0604020202020204" pitchFamily="34" charset="0"/>
+              <a:buChar char="•"/>
+            </a:pPr>
+            <a:r>
+              <a:rPr lang="en-US" altLang="ko-KR" sz="2400" dirty="0"/>
+              <a:t>Linear layout</a:t>
+            </a:r>
+          </a:p>
+          <a:p>
+            <a:pPr marL="742950" lvl="1" indent="-285750">
+              <a:buFont typeface="Arial" panose="020B0604020202020204" pitchFamily="34" charset="0"/>
+              <a:buChar char="•"/>
+            </a:pPr>
+            <a:r>
+              <a:rPr lang="ko-KR" altLang="en-US" dirty="0"/>
+              <a:t>위에서 아래</a:t>
+            </a:r>
+            <a:r>
+              <a:rPr lang="en-US" altLang="ko-KR" dirty="0"/>
+              <a:t>, </a:t>
+            </a:r>
+            <a:r>
+              <a:rPr lang="ko-KR" altLang="en-US" dirty="0"/>
+              <a:t>왼쪽에서 오른쪽으로 순차적으로 쌓는 레이아웃</a:t>
+            </a:r>
+            <a:endParaRPr lang="en-US" altLang="ko-KR" dirty="0"/>
+          </a:p>
+          <a:p>
+            <a:pPr marL="742950" lvl="1" indent="-285750">
+              <a:buFont typeface="Arial" panose="020B0604020202020204" pitchFamily="34" charset="0"/>
+              <a:buChar char="•"/>
+            </a:pPr>
+            <a:r>
+              <a:rPr lang="ko-KR" altLang="en-US" dirty="0"/>
+              <a:t>자주 사용되는 속성</a:t>
+            </a:r>
+            <a:endParaRPr lang="en-US" altLang="ko-KR" dirty="0"/>
+          </a:p>
+          <a:p>
+            <a:pPr marL="1200150" lvl="2" indent="-285750">
+              <a:buFont typeface="Arial" panose="020B0604020202020204" pitchFamily="34" charset="0"/>
+              <a:buChar char="•"/>
+            </a:pPr>
+            <a:r>
+              <a:rPr lang="en-US" altLang="ko-KR" sz="1400" dirty="0"/>
+              <a:t>Orientation (</a:t>
+            </a:r>
+            <a:r>
+              <a:rPr lang="ko-KR" altLang="en-US" sz="1400" dirty="0"/>
+              <a:t>쌓는 방향 결정</a:t>
+            </a:r>
+            <a:r>
+              <a:rPr lang="en-US" altLang="ko-KR" sz="1400" dirty="0"/>
+              <a:t>) : vertical / horizontal</a:t>
+            </a:r>
+          </a:p>
+          <a:p>
+            <a:pPr marL="1200150" lvl="2" indent="-285750">
+              <a:buFont typeface="Arial" panose="020B0604020202020204" pitchFamily="34" charset="0"/>
+              <a:buChar char="•"/>
+            </a:pPr>
+            <a:r>
+              <a:rPr lang="en-US" altLang="ko-KR" sz="1400" dirty="0"/>
+              <a:t>Gravity (</a:t>
+            </a:r>
+            <a:r>
+              <a:rPr lang="ko-KR" altLang="en-US" sz="1400" dirty="0"/>
+              <a:t>위젯이 배치되는 위치 결정</a:t>
+            </a:r>
+            <a:r>
+              <a:rPr lang="en-US" altLang="ko-KR" sz="1400" dirty="0"/>
+              <a:t>) : top / bottom / right / left</a:t>
+            </a:r>
+          </a:p>
+        </p:txBody>
+      </p:sp>
+      <p:pic>
+        <p:nvPicPr>
+          <p:cNvPr id="8" name="그림 7">
+            <a:extLst>
+              <a:ext uri="{FF2B5EF4-FFF2-40B4-BE49-F238E27FC236}">
+                <a16:creationId xmlns:a16="http://schemas.microsoft.com/office/drawing/2014/main" id="{27D0650A-695A-4F3D-BF9C-B57543950652}"/>
+              </a:ext>
+            </a:extLst>
+          </p:cNvPr>
+          <p:cNvPicPr>
+            <a:picLocks noChangeAspect="1"/>
+          </p:cNvPicPr>
+          <p:nvPr/>
+        </p:nvPicPr>
+        <p:blipFill>
+          <a:blip r:embed="rId2"/>
+          <a:stretch>
+            <a:fillRect/>
+          </a:stretch>
+        </p:blipFill>
+        <p:spPr>
+          <a:xfrm>
+            <a:off x="3629025" y="3106051"/>
+            <a:ext cx="4933950" cy="2981325"/>
+          </a:xfrm>
+          <a:prstGeom prst="rect">
+            <a:avLst/>
+          </a:prstGeom>
+        </p:spPr>
+      </p:pic>
+    </p:spTree>
+    <p:extLst>
+      <p:ext uri="{BB962C8B-B14F-4D97-AF65-F5344CB8AC3E}">
+        <p14:creationId xmlns:p14="http://schemas.microsoft.com/office/powerpoint/2010/main" val="2843551485"/>
+      </p:ext>
+    </p:extLst>
+  </p:cSld>
+  <p:clrMapOvr>
+    <a:masterClrMapping/>
+  </p:clrMapOvr>
+</p:sld>
+</file>
+
+<file path=ppt/slides/slide34.xml><?xml version="1.0" encoding="utf-8"?>
+<p:sld xmlns:a="http://schemas.openxmlformats.org/drawingml/2006/main" xmlns:r="http://schemas.openxmlformats.org/officeDocument/2006/relationships" xmlns:p="http://schemas.openxmlformats.org/presentationml/2006/main">
+  <p:cSld>
+    <p:spTree>
+      <p:nvGrpSpPr>
+        <p:cNvPr id="1" name=""/>
+        <p:cNvGrpSpPr/>
+        <p:nvPr/>
+      </p:nvGrpSpPr>
+      <p:grpSpPr>
+        <a:xfrm>
+          <a:off x="0" y="0"/>
+          <a:ext cx="0" cy="0"/>
+          <a:chOff x="0" y="0"/>
+          <a:chExt cx="0" cy="0"/>
+        </a:xfrm>
+      </p:grpSpPr>
+      <p:sp>
+        <p:nvSpPr>
+          <p:cNvPr id="2" name="제목 1">
+            <a:extLst>
+              <a:ext uri="{FF2B5EF4-FFF2-40B4-BE49-F238E27FC236}">
+                <a16:creationId xmlns:a16="http://schemas.microsoft.com/office/drawing/2014/main" id="{93EC9EF1-25B2-470B-8958-64B218A29447}"/>
+              </a:ext>
+            </a:extLst>
+          </p:cNvPr>
+          <p:cNvSpPr>
+            <a:spLocks noGrp="1"/>
+          </p:cNvSpPr>
+          <p:nvPr>
+            <p:ph type="title"/>
+          </p:nvPr>
+        </p:nvSpPr>
+        <p:spPr/>
+        <p:txBody>
+          <a:bodyPr>
+            <a:normAutofit fontScale="90000"/>
+          </a:bodyPr>
+          <a:lstStyle/>
+          <a:p>
+            <a:r>
+              <a:rPr lang="en-US" altLang="ko-KR" dirty="0"/>
+              <a:t>Layout</a:t>
+            </a:r>
+            <a:endParaRPr lang="ko-KR" altLang="en-US" dirty="0"/>
+          </a:p>
+        </p:txBody>
+      </p:sp>
+      <p:sp>
+        <p:nvSpPr>
+          <p:cNvPr id="3" name="내용 개체 틀 2">
+            <a:extLst>
+              <a:ext uri="{FF2B5EF4-FFF2-40B4-BE49-F238E27FC236}">
+                <a16:creationId xmlns:a16="http://schemas.microsoft.com/office/drawing/2014/main" id="{3AE5EED4-91BA-44E1-9311-944BA85AD85D}"/>
+              </a:ext>
+            </a:extLst>
+          </p:cNvPr>
+          <p:cNvSpPr>
+            <a:spLocks noGrp="1"/>
+          </p:cNvSpPr>
+          <p:nvPr>
+            <p:ph idx="1"/>
+          </p:nvPr>
+        </p:nvSpPr>
+        <p:spPr/>
+        <p:txBody>
+          <a:bodyPr>
+            <a:normAutofit fontScale="85000" lnSpcReduction="20000"/>
+          </a:bodyPr>
+          <a:lstStyle/>
+          <a:p>
+            <a:r>
+              <a:rPr lang="en-US" altLang="ko-KR" dirty="0"/>
+              <a:t>Frame layout</a:t>
+            </a:r>
+            <a:endParaRPr lang="ko-KR" altLang="en-US" dirty="0"/>
+          </a:p>
+        </p:txBody>
+      </p:sp>
+      <p:sp>
+        <p:nvSpPr>
+          <p:cNvPr id="4" name="텍스트 개체 틀 3">
+            <a:extLst>
+              <a:ext uri="{FF2B5EF4-FFF2-40B4-BE49-F238E27FC236}">
+                <a16:creationId xmlns:a16="http://schemas.microsoft.com/office/drawing/2014/main" id="{92BAEDC0-2F4D-4109-AAF6-73297C38FC55}"/>
+              </a:ext>
+            </a:extLst>
+          </p:cNvPr>
+          <p:cNvSpPr>
+            <a:spLocks noGrp="1"/>
+          </p:cNvSpPr>
+          <p:nvPr>
+            <p:ph type="body" sz="quarter" idx="13"/>
+          </p:nvPr>
+        </p:nvSpPr>
+        <p:spPr/>
+        <p:txBody>
+          <a:bodyPr/>
+          <a:lstStyle/>
+          <a:p>
+            <a:r>
+              <a:rPr lang="en-US" altLang="ko-KR" dirty="0"/>
+              <a:t>04</a:t>
+            </a:r>
+            <a:endParaRPr lang="ko-KR" altLang="en-US" dirty="0"/>
+          </a:p>
+        </p:txBody>
+      </p:sp>
+      <p:sp>
+        <p:nvSpPr>
+          <p:cNvPr id="15" name="슬라이드 번호 개체 틀 14">
+            <a:extLst>
+              <a:ext uri="{FF2B5EF4-FFF2-40B4-BE49-F238E27FC236}">
+                <a16:creationId xmlns:a16="http://schemas.microsoft.com/office/drawing/2014/main" id="{79B9229E-D7CD-40C2-B26F-0BF4AC1E9E93}"/>
+              </a:ext>
+            </a:extLst>
+          </p:cNvPr>
+          <p:cNvSpPr>
+            <a:spLocks noGrp="1"/>
+          </p:cNvSpPr>
+          <p:nvPr>
+            <p:ph type="sldNum" sz="quarter" idx="12"/>
+          </p:nvPr>
+        </p:nvSpPr>
+        <p:spPr/>
+        <p:txBody>
+          <a:bodyPr/>
+          <a:lstStyle/>
+          <a:p>
+            <a:fld id="{28033542-72CD-49C1-9B51-668B00668B43}" type="slidenum">
+              <a:rPr lang="ko-KR" altLang="en-US" smtClean="0"/>
+              <a:t>34</a:t>
+            </a:fld>
+            <a:endParaRPr lang="ko-KR" altLang="en-US"/>
+          </a:p>
+        </p:txBody>
+      </p:sp>
+      <p:sp>
+        <p:nvSpPr>
+          <p:cNvPr id="13" name="TextBox 12">
+            <a:extLst>
+              <a:ext uri="{FF2B5EF4-FFF2-40B4-BE49-F238E27FC236}">
+                <a16:creationId xmlns:a16="http://schemas.microsoft.com/office/drawing/2014/main" id="{E2D893D9-3930-4552-9C6B-0E0B88029121}"/>
+              </a:ext>
+            </a:extLst>
+          </p:cNvPr>
+          <p:cNvSpPr txBox="1"/>
+          <p:nvPr/>
+        </p:nvSpPr>
+        <p:spPr>
+          <a:xfrm>
+            <a:off x="700897" y="1140473"/>
+            <a:ext cx="10368722" cy="1231106"/>
+          </a:xfrm>
+          <a:prstGeom prst="rect">
+            <a:avLst/>
+          </a:prstGeom>
+          <a:noFill/>
+        </p:spPr>
+        <p:txBody>
+          <a:bodyPr wrap="square" rtlCol="0">
+            <a:spAutoFit/>
+          </a:bodyPr>
+          <a:lstStyle/>
+          <a:p>
+            <a:pPr marL="285750" indent="-285750">
+              <a:buFont typeface="Arial" panose="020B0604020202020204" pitchFamily="34" charset="0"/>
+              <a:buChar char="•"/>
+            </a:pPr>
+            <a:r>
+              <a:rPr lang="en-US" altLang="ko-KR" sz="2400" dirty="0"/>
+              <a:t>Frame layout</a:t>
+            </a:r>
+          </a:p>
+          <a:p>
+            <a:pPr marL="742950" lvl="1" indent="-285750">
+              <a:buFont typeface="Arial" panose="020B0604020202020204" pitchFamily="34" charset="0"/>
+              <a:buChar char="•"/>
+            </a:pPr>
+            <a:r>
+              <a:rPr lang="ko-KR" altLang="en-US" dirty="0"/>
+              <a:t>위젯을 여러 개 겹쳐 쌓는 레이아웃</a:t>
+            </a:r>
+            <a:endParaRPr lang="en-US" altLang="ko-KR" dirty="0"/>
+          </a:p>
+          <a:p>
+            <a:pPr marL="742950" lvl="1" indent="-285750">
+              <a:buFont typeface="Arial" panose="020B0604020202020204" pitchFamily="34" charset="0"/>
+              <a:buChar char="•"/>
+            </a:pPr>
+            <a:r>
+              <a:rPr lang="ko-KR" altLang="en-US" dirty="0"/>
+              <a:t>자주 사용되는 속성</a:t>
+            </a:r>
+            <a:endParaRPr lang="en-US" altLang="ko-KR" dirty="0"/>
+          </a:p>
+          <a:p>
+            <a:pPr marL="1200150" lvl="2" indent="-285750">
+              <a:buFont typeface="Arial" panose="020B0604020202020204" pitchFamily="34" charset="0"/>
+              <a:buChar char="•"/>
+            </a:pPr>
+            <a:r>
+              <a:rPr lang="en-US" altLang="ko-KR" sz="1400" dirty="0"/>
+              <a:t>Gravity (</a:t>
+            </a:r>
+            <a:r>
+              <a:rPr lang="ko-KR" altLang="en-US" sz="1400" dirty="0"/>
+              <a:t>위젯이 배치되는 위치 결정</a:t>
+            </a:r>
+            <a:r>
+              <a:rPr lang="en-US" altLang="ko-KR" sz="1400" dirty="0"/>
+              <a:t>) : top / bottom / right / left</a:t>
+            </a:r>
+          </a:p>
+        </p:txBody>
+      </p:sp>
+      <p:pic>
+        <p:nvPicPr>
+          <p:cNvPr id="2050" name="Picture 2" descr="Frame 레이아웃">
+            <a:extLst>
+              <a:ext uri="{FF2B5EF4-FFF2-40B4-BE49-F238E27FC236}">
+                <a16:creationId xmlns:a16="http://schemas.microsoft.com/office/drawing/2014/main" id="{9BE90814-8228-49F3-9E2B-84B9C9623960}"/>
+              </a:ext>
+            </a:extLst>
+          </p:cNvPr>
+          <p:cNvPicPr>
+            <a:picLocks noChangeAspect="1" noChangeArrowheads="1"/>
+          </p:cNvPicPr>
+          <p:nvPr/>
+        </p:nvPicPr>
+        <p:blipFill>
+          <a:blip r:embed="rId2">
+            <a:extLst>
+              <a:ext uri="{28A0092B-C50C-407E-A947-70E740481C1C}">
+                <a14:useLocalDpi xmlns:a14="http://schemas.microsoft.com/office/drawing/2010/main" val="0"/>
+              </a:ext>
+            </a:extLst>
+          </a:blip>
+          <a:srcRect/>
+          <a:stretch>
+            <a:fillRect/>
+          </a:stretch>
+        </p:blipFill>
+        <p:spPr bwMode="auto">
+          <a:xfrm>
+            <a:off x="2551508" y="3082547"/>
+            <a:ext cx="6667500" cy="2286000"/>
+          </a:xfrm>
+          <a:prstGeom prst="rect">
+            <a:avLst/>
+          </a:prstGeom>
+          <a:noFill/>
+          <a:extLst>
+            <a:ext uri="{909E8E84-426E-40DD-AFC4-6F175D3DCCD1}">
+              <a14:hiddenFill xmlns:a14="http://schemas.microsoft.com/office/drawing/2010/main">
+                <a:solidFill>
+                  <a:srgbClr val="FFFFFF"/>
+                </a:solidFill>
+              </a14:hiddenFill>
+            </a:ext>
+          </a:extLst>
+        </p:spPr>
+      </p:pic>
+    </p:spTree>
+    <p:extLst>
+      <p:ext uri="{BB962C8B-B14F-4D97-AF65-F5344CB8AC3E}">
+        <p14:creationId xmlns:p14="http://schemas.microsoft.com/office/powerpoint/2010/main" val="3467584591"/>
+      </p:ext>
+    </p:extLst>
+  </p:cSld>
+  <p:clrMapOvr>
+    <a:masterClrMapping/>
+  </p:clrMapOvr>
+</p:sld>
+</file>
+
+<file path=ppt/slides/slide35.xml><?xml version="1.0" encoding="utf-8"?>
+<p:sld xmlns:a="http://schemas.openxmlformats.org/drawingml/2006/main" xmlns:r="http://schemas.openxmlformats.org/officeDocument/2006/relationships" xmlns:p="http://schemas.openxmlformats.org/presentationml/2006/main">
+  <p:cSld>
+    <p:spTree>
+      <p:nvGrpSpPr>
+        <p:cNvPr id="1" name=""/>
+        <p:cNvGrpSpPr/>
+        <p:nvPr/>
+      </p:nvGrpSpPr>
+      <p:grpSpPr>
+        <a:xfrm>
+          <a:off x="0" y="0"/>
+          <a:ext cx="0" cy="0"/>
+          <a:chOff x="0" y="0"/>
+          <a:chExt cx="0" cy="0"/>
+        </a:xfrm>
+      </p:grpSpPr>
+      <p:sp>
+        <p:nvSpPr>
+          <p:cNvPr id="2" name="제목 1">
+            <a:extLst>
+              <a:ext uri="{FF2B5EF4-FFF2-40B4-BE49-F238E27FC236}">
+                <a16:creationId xmlns:a16="http://schemas.microsoft.com/office/drawing/2014/main" id="{93EC9EF1-25B2-470B-8958-64B218A29447}"/>
+              </a:ext>
+            </a:extLst>
+          </p:cNvPr>
+          <p:cNvSpPr>
+            <a:spLocks noGrp="1"/>
+          </p:cNvSpPr>
+          <p:nvPr>
+            <p:ph type="title"/>
+          </p:nvPr>
+        </p:nvSpPr>
+        <p:spPr/>
+        <p:txBody>
+          <a:bodyPr>
+            <a:normAutofit fontScale="90000"/>
+          </a:bodyPr>
+          <a:lstStyle/>
+          <a:p>
+            <a:r>
+              <a:rPr lang="en-US" altLang="ko-KR" dirty="0"/>
+              <a:t>Layout</a:t>
+            </a:r>
+            <a:endParaRPr lang="ko-KR" altLang="en-US" dirty="0"/>
+          </a:p>
+        </p:txBody>
+      </p:sp>
+      <p:sp>
+        <p:nvSpPr>
+          <p:cNvPr id="3" name="내용 개체 틀 2">
+            <a:extLst>
+              <a:ext uri="{FF2B5EF4-FFF2-40B4-BE49-F238E27FC236}">
+                <a16:creationId xmlns:a16="http://schemas.microsoft.com/office/drawing/2014/main" id="{3AE5EED4-91BA-44E1-9311-944BA85AD85D}"/>
+              </a:ext>
+            </a:extLst>
+          </p:cNvPr>
+          <p:cNvSpPr>
+            <a:spLocks noGrp="1"/>
+          </p:cNvSpPr>
+          <p:nvPr>
+            <p:ph idx="1"/>
+          </p:nvPr>
+        </p:nvSpPr>
+        <p:spPr/>
+        <p:txBody>
+          <a:bodyPr>
+            <a:normAutofit fontScale="85000" lnSpcReduction="20000"/>
+          </a:bodyPr>
+          <a:lstStyle/>
+          <a:p>
+            <a:r>
+              <a:rPr lang="en-US" altLang="ko-KR" dirty="0"/>
+              <a:t>Constraint layout</a:t>
+            </a:r>
+            <a:endParaRPr lang="ko-KR" altLang="en-US" dirty="0"/>
+          </a:p>
+        </p:txBody>
+      </p:sp>
+      <p:sp>
+        <p:nvSpPr>
+          <p:cNvPr id="4" name="텍스트 개체 틀 3">
+            <a:extLst>
+              <a:ext uri="{FF2B5EF4-FFF2-40B4-BE49-F238E27FC236}">
+                <a16:creationId xmlns:a16="http://schemas.microsoft.com/office/drawing/2014/main" id="{92BAEDC0-2F4D-4109-AAF6-73297C38FC55}"/>
+              </a:ext>
+            </a:extLst>
+          </p:cNvPr>
+          <p:cNvSpPr>
+            <a:spLocks noGrp="1"/>
+          </p:cNvSpPr>
+          <p:nvPr>
+            <p:ph type="body" sz="quarter" idx="13"/>
+          </p:nvPr>
+        </p:nvSpPr>
+        <p:spPr/>
+        <p:txBody>
+          <a:bodyPr/>
+          <a:lstStyle/>
+          <a:p>
+            <a:r>
+              <a:rPr lang="en-US" altLang="ko-KR" dirty="0"/>
+              <a:t>04</a:t>
+            </a:r>
+            <a:endParaRPr lang="ko-KR" altLang="en-US" dirty="0"/>
+          </a:p>
+        </p:txBody>
+      </p:sp>
+      <p:sp>
+        <p:nvSpPr>
+          <p:cNvPr id="15" name="슬라이드 번호 개체 틀 14">
+            <a:extLst>
+              <a:ext uri="{FF2B5EF4-FFF2-40B4-BE49-F238E27FC236}">
+                <a16:creationId xmlns:a16="http://schemas.microsoft.com/office/drawing/2014/main" id="{79B9229E-D7CD-40C2-B26F-0BF4AC1E9E93}"/>
+              </a:ext>
+            </a:extLst>
+          </p:cNvPr>
+          <p:cNvSpPr>
+            <a:spLocks noGrp="1"/>
+          </p:cNvSpPr>
+          <p:nvPr>
+            <p:ph type="sldNum" sz="quarter" idx="12"/>
+          </p:nvPr>
+        </p:nvSpPr>
+        <p:spPr/>
+        <p:txBody>
+          <a:bodyPr/>
+          <a:lstStyle/>
+          <a:p>
+            <a:fld id="{28033542-72CD-49C1-9B51-668B00668B43}" type="slidenum">
+              <a:rPr lang="ko-KR" altLang="en-US" smtClean="0"/>
+              <a:t>35</a:t>
+            </a:fld>
+            <a:endParaRPr lang="ko-KR" altLang="en-US"/>
+          </a:p>
+        </p:txBody>
+      </p:sp>
+      <p:sp>
+        <p:nvSpPr>
+          <p:cNvPr id="13" name="TextBox 12">
+            <a:extLst>
+              <a:ext uri="{FF2B5EF4-FFF2-40B4-BE49-F238E27FC236}">
+                <a16:creationId xmlns:a16="http://schemas.microsoft.com/office/drawing/2014/main" id="{E2D893D9-3930-4552-9C6B-0E0B88029121}"/>
+              </a:ext>
+            </a:extLst>
+          </p:cNvPr>
+          <p:cNvSpPr txBox="1"/>
+          <p:nvPr/>
+        </p:nvSpPr>
+        <p:spPr>
+          <a:xfrm>
+            <a:off x="700897" y="1140473"/>
+            <a:ext cx="10368722" cy="1292662"/>
+          </a:xfrm>
+          <a:prstGeom prst="rect">
+            <a:avLst/>
+          </a:prstGeom>
+          <a:noFill/>
+        </p:spPr>
+        <p:txBody>
+          <a:bodyPr wrap="square" rtlCol="0">
+            <a:spAutoFit/>
+          </a:bodyPr>
+          <a:lstStyle/>
+          <a:p>
+            <a:pPr marL="285750" indent="-285750">
+              <a:buFont typeface="Arial" panose="020B0604020202020204" pitchFamily="34" charset="0"/>
+              <a:buChar char="•"/>
+            </a:pPr>
+            <a:r>
+              <a:rPr lang="en-US" altLang="ko-KR" sz="2400" dirty="0"/>
+              <a:t>Constraint layout</a:t>
+            </a:r>
+          </a:p>
+          <a:p>
+            <a:pPr marL="742950" lvl="1" indent="-285750">
+              <a:buFont typeface="Arial" panose="020B0604020202020204" pitchFamily="34" charset="0"/>
+              <a:buChar char="•"/>
+            </a:pPr>
+            <a:r>
+              <a:rPr lang="ko-KR" altLang="en-US" dirty="0"/>
+              <a:t>위젯의 위치를 부모 레이아웃 및 다른 위젯을 기준으로 결정하는 레이아웃</a:t>
+            </a:r>
+            <a:endParaRPr lang="en-US" altLang="ko-KR" dirty="0"/>
+          </a:p>
+          <a:p>
+            <a:pPr marL="742950" lvl="1" indent="-285750">
+              <a:buFont typeface="Arial" panose="020B0604020202020204" pitchFamily="34" charset="0"/>
+              <a:buChar char="•"/>
+            </a:pPr>
+            <a:r>
+              <a:rPr lang="ko-KR" altLang="en-US" dirty="0"/>
+              <a:t>레이아웃 중첩 문제가 없어 성능상 이점이 있음</a:t>
+            </a:r>
+            <a:endParaRPr lang="en-US" altLang="ko-KR" dirty="0"/>
+          </a:p>
+          <a:p>
+            <a:pPr marL="742950" lvl="1" indent="-285750">
+              <a:buFont typeface="Arial" panose="020B0604020202020204" pitchFamily="34" charset="0"/>
+              <a:buChar char="•"/>
+            </a:pPr>
+            <a:r>
+              <a:rPr lang="ko-KR" altLang="en-US" dirty="0"/>
+              <a:t>마우스로 레이아웃을 구성하기 매우 편리함</a:t>
+            </a:r>
+            <a:endParaRPr lang="en-US" altLang="ko-KR" dirty="0"/>
+          </a:p>
+        </p:txBody>
+      </p:sp>
+      <p:pic>
+        <p:nvPicPr>
+          <p:cNvPr id="4100" name="Picture 4" descr="Creating awesome animations using ConstraintLayout and ConstraintSet — part  2 | by Hari Vignesh Jayapalan | ProAndroidDev">
+            <a:extLst>
+              <a:ext uri="{FF2B5EF4-FFF2-40B4-BE49-F238E27FC236}">
+                <a16:creationId xmlns:a16="http://schemas.microsoft.com/office/drawing/2014/main" id="{EA330788-BFDB-42D6-A350-401CFFAAA963}"/>
+              </a:ext>
+            </a:extLst>
+          </p:cNvPr>
+          <p:cNvPicPr>
+            <a:picLocks noChangeAspect="1" noChangeArrowheads="1"/>
+          </p:cNvPicPr>
+          <p:nvPr/>
+        </p:nvPicPr>
+        <p:blipFill>
+          <a:blip r:embed="rId2">
+            <a:extLst>
+              <a:ext uri="{28A0092B-C50C-407E-A947-70E740481C1C}">
+                <a14:useLocalDpi xmlns:a14="http://schemas.microsoft.com/office/drawing/2010/main" val="0"/>
+              </a:ext>
+            </a:extLst>
+          </a:blip>
+          <a:srcRect/>
+          <a:stretch>
+            <a:fillRect/>
+          </a:stretch>
+        </p:blipFill>
+        <p:spPr bwMode="auto">
+          <a:xfrm>
+            <a:off x="2516659" y="2638712"/>
+            <a:ext cx="7158681" cy="3538467"/>
+          </a:xfrm>
+          <a:prstGeom prst="rect">
+            <a:avLst/>
+          </a:prstGeom>
+          <a:noFill/>
+          <a:extLst>
+            <a:ext uri="{909E8E84-426E-40DD-AFC4-6F175D3DCCD1}">
+              <a14:hiddenFill xmlns:a14="http://schemas.microsoft.com/office/drawing/2010/main">
+                <a:solidFill>
+                  <a:srgbClr val="FFFFFF"/>
+                </a:solidFill>
+              </a14:hiddenFill>
+            </a:ext>
+          </a:extLst>
+        </p:spPr>
+      </p:pic>
+    </p:spTree>
+    <p:extLst>
+      <p:ext uri="{BB962C8B-B14F-4D97-AF65-F5344CB8AC3E}">
+        <p14:creationId xmlns:p14="http://schemas.microsoft.com/office/powerpoint/2010/main" val="4070139397"/>
+      </p:ext>
+    </p:extLst>
+  </p:cSld>
+  <p:clrMapOvr>
+    <a:masterClrMapping/>
+  </p:clrMapOvr>
+</p:sld>
+</file>
+
+<file path=ppt/slides/slide36.xml><?xml version="1.0" encoding="utf-8"?>
+<p:sld xmlns:a="http://schemas.openxmlformats.org/drawingml/2006/main" xmlns:r="http://schemas.openxmlformats.org/officeDocument/2006/relationships" xmlns:p="http://schemas.openxmlformats.org/presentationml/2006/main">
+  <p:cSld>
+    <p:spTree>
+      <p:nvGrpSpPr>
+        <p:cNvPr id="1" name=""/>
+        <p:cNvGrpSpPr/>
+        <p:nvPr/>
+      </p:nvGrpSpPr>
+      <p:grpSpPr>
+        <a:xfrm>
+          <a:off x="0" y="0"/>
+          <a:ext cx="0" cy="0"/>
+          <a:chOff x="0" y="0"/>
+          <a:chExt cx="0" cy="0"/>
+        </a:xfrm>
+      </p:grpSpPr>
+      <p:sp>
+        <p:nvSpPr>
+          <p:cNvPr id="2" name="텍스트 개체 틀 1">
+            <a:extLst>
+              <a:ext uri="{FF2B5EF4-FFF2-40B4-BE49-F238E27FC236}">
+                <a16:creationId xmlns:a16="http://schemas.microsoft.com/office/drawing/2014/main" id="{6DA4C9B3-2C63-4453-8F40-DD3870893A8E}"/>
+              </a:ext>
+            </a:extLst>
+          </p:cNvPr>
+          <p:cNvSpPr>
+            <a:spLocks noGrp="1"/>
+          </p:cNvSpPr>
+          <p:nvPr>
+            <p:ph type="body" sz="quarter" idx="13"/>
+          </p:nvPr>
+        </p:nvSpPr>
+        <p:spPr/>
+        <p:txBody>
+          <a:bodyPr>
+            <a:normAutofit fontScale="92500" lnSpcReduction="10000"/>
+          </a:bodyPr>
+          <a:lstStyle/>
+          <a:p>
+            <a:r>
+              <a:rPr lang="en-US" altLang="ko-KR" b="1" dirty="0"/>
+              <a:t>05</a:t>
+            </a:r>
+            <a:endParaRPr lang="ko-KR" altLang="en-US" b="1" dirty="0"/>
+          </a:p>
+        </p:txBody>
+      </p:sp>
+      <p:sp>
+        <p:nvSpPr>
+          <p:cNvPr id="3" name="텍스트 개체 틀 2">
+            <a:extLst>
+              <a:ext uri="{FF2B5EF4-FFF2-40B4-BE49-F238E27FC236}">
+                <a16:creationId xmlns:a16="http://schemas.microsoft.com/office/drawing/2014/main" id="{9ECEBF0C-A8E8-4871-B2CA-0EBEDA355F07}"/>
+              </a:ext>
+            </a:extLst>
+          </p:cNvPr>
+          <p:cNvSpPr>
+            <a:spLocks noGrp="1"/>
+          </p:cNvSpPr>
+          <p:nvPr>
+            <p:ph type="body" sz="quarter" idx="14"/>
+          </p:nvPr>
+        </p:nvSpPr>
+        <p:spPr/>
+        <p:txBody>
+          <a:bodyPr/>
+          <a:lstStyle/>
+          <a:p>
+            <a:r>
+              <a:rPr lang="en-US" altLang="ko-KR" b="1" dirty="0"/>
+              <a:t>Widget</a:t>
+            </a:r>
+            <a:endParaRPr lang="ko-KR" altLang="en-US" b="1" dirty="0"/>
+          </a:p>
+        </p:txBody>
+      </p:sp>
+      <p:sp>
+        <p:nvSpPr>
+          <p:cNvPr id="4" name="텍스트 개체 틀 3">
+            <a:extLst>
+              <a:ext uri="{FF2B5EF4-FFF2-40B4-BE49-F238E27FC236}">
+                <a16:creationId xmlns:a16="http://schemas.microsoft.com/office/drawing/2014/main" id="{B49FEE3A-7EC1-4A37-8AAC-6D8866E6E3AD}"/>
+              </a:ext>
+            </a:extLst>
+          </p:cNvPr>
+          <p:cNvSpPr>
+            <a:spLocks noGrp="1"/>
+          </p:cNvSpPr>
+          <p:nvPr>
+            <p:ph type="body" sz="quarter" idx="15"/>
+          </p:nvPr>
+        </p:nvSpPr>
+        <p:spPr/>
+        <p:txBody>
+          <a:bodyPr/>
+          <a:lstStyle/>
+          <a:p>
+            <a:r>
+              <a:rPr lang="ko-KR" altLang="en-US" b="1" dirty="0"/>
+              <a:t>목표</a:t>
+            </a:r>
+            <a:endParaRPr lang="en-US" altLang="ko-KR" b="1" dirty="0"/>
+          </a:p>
+          <a:p>
+            <a:pPr marL="285750" indent="-285750">
+              <a:buFont typeface="Arial" panose="020B0604020202020204" pitchFamily="34" charset="0"/>
+              <a:buChar char="•"/>
+            </a:pPr>
+            <a:r>
+              <a:rPr lang="en-US" altLang="ko-KR" dirty="0"/>
+              <a:t>Android</a:t>
+            </a:r>
+            <a:r>
+              <a:rPr lang="ko-KR" altLang="en-US" dirty="0"/>
+              <a:t>에서 많이 사용되는 기본 </a:t>
+            </a:r>
+            <a:r>
+              <a:rPr lang="en-US" altLang="ko-KR" dirty="0"/>
+              <a:t>widget</a:t>
+            </a:r>
+            <a:r>
+              <a:rPr lang="ko-KR" altLang="en-US" dirty="0"/>
+              <a:t>들의 종류에 대해 학습</a:t>
+            </a:r>
+            <a:endParaRPr lang="en-US" altLang="ko-KR" dirty="0"/>
+          </a:p>
+          <a:p>
+            <a:pPr marL="285750" indent="-285750">
+              <a:buFont typeface="Arial" panose="020B0604020202020204" pitchFamily="34" charset="0"/>
+              <a:buChar char="•"/>
+            </a:pPr>
+            <a:r>
+              <a:rPr lang="en-US" altLang="ko-KR" dirty="0"/>
+              <a:t>Widget</a:t>
+            </a:r>
+            <a:r>
+              <a:rPr lang="ko-KR" altLang="en-US" dirty="0"/>
+              <a:t>들을 사용하는 방법에 대해 학습</a:t>
+            </a:r>
+            <a:endParaRPr lang="en-US" altLang="ko-KR" dirty="0"/>
+          </a:p>
+        </p:txBody>
+      </p:sp>
+      <p:sp>
+        <p:nvSpPr>
+          <p:cNvPr id="5" name="슬라이드 번호 개체 틀 4">
+            <a:extLst>
+              <a:ext uri="{FF2B5EF4-FFF2-40B4-BE49-F238E27FC236}">
+                <a16:creationId xmlns:a16="http://schemas.microsoft.com/office/drawing/2014/main" id="{423E0977-1D3F-4826-AB80-7E3B178FEE23}"/>
+              </a:ext>
+            </a:extLst>
+          </p:cNvPr>
+          <p:cNvSpPr>
+            <a:spLocks noGrp="1"/>
+          </p:cNvSpPr>
+          <p:nvPr>
+            <p:ph type="sldNum" sz="quarter" idx="12"/>
+          </p:nvPr>
+        </p:nvSpPr>
+        <p:spPr/>
+        <p:txBody>
+          <a:bodyPr/>
+          <a:lstStyle/>
+          <a:p>
+            <a:fld id="{28033542-72CD-49C1-9B51-668B00668B43}" type="slidenum">
+              <a:rPr lang="ko-KR" altLang="en-US" smtClean="0"/>
+              <a:t>36</a:t>
+            </a:fld>
+            <a:endParaRPr lang="ko-KR" altLang="en-US"/>
+          </a:p>
+        </p:txBody>
+      </p:sp>
+    </p:spTree>
+    <p:extLst>
+      <p:ext uri="{BB962C8B-B14F-4D97-AF65-F5344CB8AC3E}">
+        <p14:creationId xmlns:p14="http://schemas.microsoft.com/office/powerpoint/2010/main" val="2552460955"/>
+      </p:ext>
+    </p:extLst>
+  </p:cSld>
+  <p:clrMapOvr>
+    <a:masterClrMapping/>
+  </p:clrMapOvr>
+</p:sld>
+</file>
+
+<file path=ppt/slides/slide37.xml><?xml version="1.0" encoding="utf-8"?>
+<p:sld xmlns:a="http://schemas.openxmlformats.org/drawingml/2006/main" xmlns:r="http://schemas.openxmlformats.org/officeDocument/2006/relationships" xmlns:p="http://schemas.openxmlformats.org/presentationml/2006/main">
+  <p:cSld>
+    <p:spTree>
+      <p:nvGrpSpPr>
+        <p:cNvPr id="1" name=""/>
+        <p:cNvGrpSpPr/>
+        <p:nvPr/>
+      </p:nvGrpSpPr>
+      <p:grpSpPr>
+        <a:xfrm>
+          <a:off x="0" y="0"/>
+          <a:ext cx="0" cy="0"/>
+          <a:chOff x="0" y="0"/>
+          <a:chExt cx="0" cy="0"/>
+        </a:xfrm>
+      </p:grpSpPr>
+      <p:sp>
+        <p:nvSpPr>
+          <p:cNvPr id="2" name="제목 1">
+            <a:extLst>
+              <a:ext uri="{FF2B5EF4-FFF2-40B4-BE49-F238E27FC236}">
+                <a16:creationId xmlns:a16="http://schemas.microsoft.com/office/drawing/2014/main" id="{93EC9EF1-25B2-470B-8958-64B218A29447}"/>
+              </a:ext>
+            </a:extLst>
+          </p:cNvPr>
+          <p:cNvSpPr>
+            <a:spLocks noGrp="1"/>
+          </p:cNvSpPr>
+          <p:nvPr>
+            <p:ph type="title"/>
+          </p:nvPr>
+        </p:nvSpPr>
+        <p:spPr/>
+        <p:txBody>
+          <a:bodyPr>
+            <a:normAutofit fontScale="90000"/>
+          </a:bodyPr>
+          <a:lstStyle/>
+          <a:p>
+            <a:r>
+              <a:rPr lang="en-US" altLang="ko-KR" dirty="0"/>
+              <a:t>Widget</a:t>
+            </a:r>
+            <a:endParaRPr lang="ko-KR" altLang="en-US" dirty="0"/>
+          </a:p>
+        </p:txBody>
+      </p:sp>
+      <p:sp>
+        <p:nvSpPr>
+          <p:cNvPr id="3" name="내용 개체 틀 2">
+            <a:extLst>
+              <a:ext uri="{FF2B5EF4-FFF2-40B4-BE49-F238E27FC236}">
+                <a16:creationId xmlns:a16="http://schemas.microsoft.com/office/drawing/2014/main" id="{3AE5EED4-91BA-44E1-9311-944BA85AD85D}"/>
+              </a:ext>
+            </a:extLst>
+          </p:cNvPr>
+          <p:cNvSpPr>
+            <a:spLocks noGrp="1"/>
+          </p:cNvSpPr>
+          <p:nvPr>
+            <p:ph idx="1"/>
+          </p:nvPr>
+        </p:nvSpPr>
+        <p:spPr/>
+        <p:txBody>
+          <a:bodyPr>
+            <a:normAutofit fontScale="85000" lnSpcReduction="20000"/>
+          </a:bodyPr>
+          <a:lstStyle/>
+          <a:p>
+            <a:r>
+              <a:rPr lang="ko-KR" altLang="en-US" dirty="0"/>
+              <a:t>다양한 </a:t>
+            </a:r>
+            <a:r>
+              <a:rPr lang="en-US" altLang="ko-KR" dirty="0"/>
+              <a:t>Widget</a:t>
+            </a:r>
+            <a:r>
+              <a:rPr lang="ko-KR" altLang="en-US" dirty="0"/>
+              <a:t>들</a:t>
+            </a:r>
+          </a:p>
+        </p:txBody>
+      </p:sp>
+      <p:sp>
+        <p:nvSpPr>
+          <p:cNvPr id="4" name="텍스트 개체 틀 3">
+            <a:extLst>
+              <a:ext uri="{FF2B5EF4-FFF2-40B4-BE49-F238E27FC236}">
+                <a16:creationId xmlns:a16="http://schemas.microsoft.com/office/drawing/2014/main" id="{92BAEDC0-2F4D-4109-AAF6-73297C38FC55}"/>
+              </a:ext>
+            </a:extLst>
+          </p:cNvPr>
+          <p:cNvSpPr>
+            <a:spLocks noGrp="1"/>
+          </p:cNvSpPr>
+          <p:nvPr>
+            <p:ph type="body" sz="quarter" idx="13"/>
+          </p:nvPr>
+        </p:nvSpPr>
+        <p:spPr/>
+        <p:txBody>
+          <a:bodyPr/>
+          <a:lstStyle/>
+          <a:p>
+            <a:r>
+              <a:rPr lang="en-US" altLang="ko-KR" dirty="0"/>
+              <a:t>05</a:t>
+            </a:r>
+            <a:endParaRPr lang="ko-KR" altLang="en-US" dirty="0"/>
+          </a:p>
+        </p:txBody>
+      </p:sp>
+      <p:sp>
+        <p:nvSpPr>
+          <p:cNvPr id="15" name="슬라이드 번호 개체 틀 14">
+            <a:extLst>
+              <a:ext uri="{FF2B5EF4-FFF2-40B4-BE49-F238E27FC236}">
+                <a16:creationId xmlns:a16="http://schemas.microsoft.com/office/drawing/2014/main" id="{79B9229E-D7CD-40C2-B26F-0BF4AC1E9E93}"/>
+              </a:ext>
+            </a:extLst>
+          </p:cNvPr>
+          <p:cNvSpPr>
+            <a:spLocks noGrp="1"/>
+          </p:cNvSpPr>
+          <p:nvPr>
+            <p:ph type="sldNum" sz="quarter" idx="12"/>
+          </p:nvPr>
+        </p:nvSpPr>
+        <p:spPr/>
+        <p:txBody>
+          <a:bodyPr/>
+          <a:lstStyle/>
+          <a:p>
+            <a:fld id="{28033542-72CD-49C1-9B51-668B00668B43}" type="slidenum">
+              <a:rPr lang="ko-KR" altLang="en-US" smtClean="0"/>
+              <a:t>37</a:t>
+            </a:fld>
+            <a:endParaRPr lang="ko-KR" altLang="en-US"/>
+          </a:p>
+        </p:txBody>
+      </p:sp>
+      <p:sp>
+        <p:nvSpPr>
+          <p:cNvPr id="13" name="TextBox 12">
+            <a:extLst>
+              <a:ext uri="{FF2B5EF4-FFF2-40B4-BE49-F238E27FC236}">
+                <a16:creationId xmlns:a16="http://schemas.microsoft.com/office/drawing/2014/main" id="{E2D893D9-3930-4552-9C6B-0E0B88029121}"/>
+              </a:ext>
+            </a:extLst>
+          </p:cNvPr>
+          <p:cNvSpPr txBox="1"/>
+          <p:nvPr/>
+        </p:nvSpPr>
+        <p:spPr>
+          <a:xfrm>
+            <a:off x="700897" y="1140473"/>
+            <a:ext cx="10368722" cy="3231654"/>
+          </a:xfrm>
+          <a:prstGeom prst="rect">
+            <a:avLst/>
+          </a:prstGeom>
+          <a:noFill/>
+        </p:spPr>
+        <p:txBody>
+          <a:bodyPr wrap="square" rtlCol="0">
+            <a:spAutoFit/>
+          </a:bodyPr>
+          <a:lstStyle/>
+          <a:p>
+            <a:pPr marL="285750" indent="-285750">
+              <a:buFont typeface="Arial" panose="020B0604020202020204" pitchFamily="34" charset="0"/>
+              <a:buChar char="•"/>
+            </a:pPr>
+            <a:r>
+              <a:rPr lang="ko-KR" altLang="en-US" sz="2400" dirty="0"/>
+              <a:t>자주 사용되는 위젯들</a:t>
+            </a:r>
+            <a:endParaRPr lang="en-US" altLang="ko-KR" sz="2400" dirty="0"/>
+          </a:p>
+          <a:p>
+            <a:pPr marL="742950" lvl="1" indent="-285750">
+              <a:buFont typeface="Arial" panose="020B0604020202020204" pitchFamily="34" charset="0"/>
+              <a:buChar char="•"/>
+            </a:pPr>
+            <a:r>
+              <a:rPr lang="en-US" altLang="ko-KR" dirty="0" err="1"/>
+              <a:t>TextView</a:t>
+            </a:r>
+            <a:endParaRPr lang="en-US" altLang="ko-KR" dirty="0"/>
+          </a:p>
+          <a:p>
+            <a:pPr marL="742950" lvl="1" indent="-285750">
+              <a:buFont typeface="Arial" panose="020B0604020202020204" pitchFamily="34" charset="0"/>
+              <a:buChar char="•"/>
+            </a:pPr>
+            <a:r>
+              <a:rPr lang="en-US" altLang="ko-KR" dirty="0" err="1"/>
+              <a:t>EditText</a:t>
+            </a:r>
+            <a:endParaRPr lang="en-US" altLang="ko-KR" dirty="0"/>
+          </a:p>
+          <a:p>
+            <a:pPr marL="742950" lvl="1" indent="-285750">
+              <a:buFont typeface="Arial" panose="020B0604020202020204" pitchFamily="34" charset="0"/>
+              <a:buChar char="•"/>
+            </a:pPr>
+            <a:r>
+              <a:rPr lang="en-US" altLang="ko-KR" dirty="0"/>
+              <a:t>Button</a:t>
+            </a:r>
+          </a:p>
+          <a:p>
+            <a:pPr marL="742950" lvl="1" indent="-285750">
+              <a:buFont typeface="Arial" panose="020B0604020202020204" pitchFamily="34" charset="0"/>
+              <a:buChar char="•"/>
+            </a:pPr>
+            <a:r>
+              <a:rPr lang="en-US" altLang="ko-KR" dirty="0" err="1"/>
+              <a:t>ToggleButton</a:t>
+            </a:r>
+            <a:endParaRPr lang="en-US" altLang="ko-KR" dirty="0"/>
+          </a:p>
+          <a:p>
+            <a:pPr marL="742950" lvl="1" indent="-285750">
+              <a:buFont typeface="Arial" panose="020B0604020202020204" pitchFamily="34" charset="0"/>
+              <a:buChar char="•"/>
+            </a:pPr>
+            <a:r>
+              <a:rPr lang="en-US" altLang="ko-KR" dirty="0" err="1"/>
+              <a:t>CheckBox</a:t>
+            </a:r>
+            <a:endParaRPr lang="en-US" altLang="ko-KR" dirty="0"/>
+          </a:p>
+          <a:p>
+            <a:pPr marL="742950" lvl="1" indent="-285750">
+              <a:buFont typeface="Arial" panose="020B0604020202020204" pitchFamily="34" charset="0"/>
+              <a:buChar char="•"/>
+            </a:pPr>
+            <a:r>
+              <a:rPr lang="en-US" altLang="ko-KR" dirty="0" err="1"/>
+              <a:t>RadioGroup</a:t>
+            </a:r>
+            <a:r>
+              <a:rPr lang="en-US" altLang="ko-KR" dirty="0"/>
+              <a:t> / </a:t>
+            </a:r>
+            <a:r>
+              <a:rPr lang="en-US" altLang="ko-KR" dirty="0" err="1"/>
+              <a:t>RadioButton</a:t>
+            </a:r>
+            <a:endParaRPr lang="en-US" altLang="ko-KR" dirty="0"/>
+          </a:p>
+          <a:p>
+            <a:pPr marL="742950" lvl="1" indent="-285750">
+              <a:buFont typeface="Arial" panose="020B0604020202020204" pitchFamily="34" charset="0"/>
+              <a:buChar char="•"/>
+            </a:pPr>
+            <a:r>
+              <a:rPr lang="en-US" altLang="ko-KR" dirty="0"/>
+              <a:t>Switch</a:t>
+            </a:r>
+          </a:p>
+          <a:p>
+            <a:pPr marL="742950" lvl="1" indent="-285750">
+              <a:buFont typeface="Arial" panose="020B0604020202020204" pitchFamily="34" charset="0"/>
+              <a:buChar char="•"/>
+            </a:pPr>
+            <a:r>
+              <a:rPr lang="en-US" altLang="ko-KR" dirty="0" err="1"/>
+              <a:t>ImageView</a:t>
+            </a:r>
+            <a:endParaRPr lang="en-US" altLang="ko-KR" dirty="0"/>
+          </a:p>
+          <a:p>
+            <a:pPr marL="742950" lvl="1" indent="-285750">
+              <a:buFont typeface="Arial" panose="020B0604020202020204" pitchFamily="34" charset="0"/>
+              <a:buChar char="•"/>
+            </a:pPr>
+            <a:r>
+              <a:rPr lang="en-US" altLang="ko-KR" dirty="0" err="1"/>
+              <a:t>ImageButton</a:t>
+            </a:r>
+            <a:endParaRPr lang="en-US" altLang="ko-KR" dirty="0"/>
+          </a:p>
+          <a:p>
+            <a:pPr marL="742950" lvl="1" indent="-285750">
+              <a:buFont typeface="Arial" panose="020B0604020202020204" pitchFamily="34" charset="0"/>
+              <a:buChar char="•"/>
+            </a:pPr>
+            <a:r>
+              <a:rPr lang="ko-KR" altLang="en-US" dirty="0"/>
+              <a:t>등등</a:t>
+            </a:r>
+            <a:r>
+              <a:rPr lang="en-US" altLang="ko-KR" dirty="0"/>
+              <a:t>…</a:t>
+            </a:r>
+          </a:p>
+        </p:txBody>
+      </p:sp>
+    </p:spTree>
+    <p:extLst>
+      <p:ext uri="{BB962C8B-B14F-4D97-AF65-F5344CB8AC3E}">
+        <p14:creationId xmlns:p14="http://schemas.microsoft.com/office/powerpoint/2010/main" val="1089243025"/>
+      </p:ext>
+    </p:extLst>
+  </p:cSld>
+  <p:clrMapOvr>
+    <a:masterClrMapping/>
+  </p:clrMapOvr>
+</p:sld>
+</file>
+
+<file path=ppt/slides/slide38.xml><?xml version="1.0" encoding="utf-8"?>
 <p:sld xmlns:a="http://schemas.openxmlformats.org/drawingml/2006/main" xmlns:r="http://schemas.openxmlformats.org/officeDocument/2006/relationships" xmlns:p="http://schemas.openxmlformats.org/presentationml/2006/main">
   <p:cSld>
     <p:spTree>

</xml_diff>